<commit_message>
how to add pubfinder to the home screen
</commit_message>
<xml_diff>
--- a/help/pubfinder_help.pptx
+++ b/help/pubfinder_help.pptx
@@ -7,6 +7,7 @@
   <p:sldIdLst>
     <p:sldId id="256" r:id="rId2"/>
     <p:sldId id="257" r:id="rId3"/>
+    <p:sldId id="258" r:id="rId4"/>
   </p:sldIdLst>
   <p:sldSz cx="12192000" cy="6858000"/>
   <p:notesSz cx="6858000" cy="9144000"/>
@@ -260,7 +261,7 @@
           <a:p>
             <a:fld id="{E37A5BA7-640B-4993-BC4B-2A86B10B6055}" type="datetimeFigureOut">
               <a:rPr lang="de-DE" smtClean="0"/>
-              <a:t>24.01.2025</a:t>
+              <a:t>05.02.2025</a:t>
             </a:fld>
             <a:endParaRPr lang="de-DE"/>
           </a:p>
@@ -458,7 +459,7 @@
           <a:p>
             <a:fld id="{E37A5BA7-640B-4993-BC4B-2A86B10B6055}" type="datetimeFigureOut">
               <a:rPr lang="de-DE" smtClean="0"/>
-              <a:t>24.01.2025</a:t>
+              <a:t>05.02.2025</a:t>
             </a:fld>
             <a:endParaRPr lang="de-DE"/>
           </a:p>
@@ -666,7 +667,7 @@
           <a:p>
             <a:fld id="{E37A5BA7-640B-4993-BC4B-2A86B10B6055}" type="datetimeFigureOut">
               <a:rPr lang="de-DE" smtClean="0"/>
-              <a:t>24.01.2025</a:t>
+              <a:t>05.02.2025</a:t>
             </a:fld>
             <a:endParaRPr lang="de-DE"/>
           </a:p>
@@ -864,7 +865,7 @@
           <a:p>
             <a:fld id="{E37A5BA7-640B-4993-BC4B-2A86B10B6055}" type="datetimeFigureOut">
               <a:rPr lang="de-DE" smtClean="0"/>
-              <a:t>24.01.2025</a:t>
+              <a:t>05.02.2025</a:t>
             </a:fld>
             <a:endParaRPr lang="de-DE"/>
           </a:p>
@@ -1139,7 +1140,7 @@
           <a:p>
             <a:fld id="{E37A5BA7-640B-4993-BC4B-2A86B10B6055}" type="datetimeFigureOut">
               <a:rPr lang="de-DE" smtClean="0"/>
-              <a:t>24.01.2025</a:t>
+              <a:t>05.02.2025</a:t>
             </a:fld>
             <a:endParaRPr lang="de-DE"/>
           </a:p>
@@ -1404,7 +1405,7 @@
           <a:p>
             <a:fld id="{E37A5BA7-640B-4993-BC4B-2A86B10B6055}" type="datetimeFigureOut">
               <a:rPr lang="de-DE" smtClean="0"/>
-              <a:t>24.01.2025</a:t>
+              <a:t>05.02.2025</a:t>
             </a:fld>
             <a:endParaRPr lang="de-DE"/>
           </a:p>
@@ -1816,7 +1817,7 @@
           <a:p>
             <a:fld id="{E37A5BA7-640B-4993-BC4B-2A86B10B6055}" type="datetimeFigureOut">
               <a:rPr lang="de-DE" smtClean="0"/>
-              <a:t>24.01.2025</a:t>
+              <a:t>05.02.2025</a:t>
             </a:fld>
             <a:endParaRPr lang="de-DE"/>
           </a:p>
@@ -1957,7 +1958,7 @@
           <a:p>
             <a:fld id="{E37A5BA7-640B-4993-BC4B-2A86B10B6055}" type="datetimeFigureOut">
               <a:rPr lang="de-DE" smtClean="0"/>
-              <a:t>24.01.2025</a:t>
+              <a:t>05.02.2025</a:t>
             </a:fld>
             <a:endParaRPr lang="de-DE"/>
           </a:p>
@@ -2070,7 +2071,7 @@
           <a:p>
             <a:fld id="{E37A5BA7-640B-4993-BC4B-2A86B10B6055}" type="datetimeFigureOut">
               <a:rPr lang="de-DE" smtClean="0"/>
-              <a:t>24.01.2025</a:t>
+              <a:t>05.02.2025</a:t>
             </a:fld>
             <a:endParaRPr lang="de-DE"/>
           </a:p>
@@ -2381,7 +2382,7 @@
           <a:p>
             <a:fld id="{E37A5BA7-640B-4993-BC4B-2A86B10B6055}" type="datetimeFigureOut">
               <a:rPr lang="de-DE" smtClean="0"/>
-              <a:t>24.01.2025</a:t>
+              <a:t>05.02.2025</a:t>
             </a:fld>
             <a:endParaRPr lang="de-DE"/>
           </a:p>
@@ -2669,7 +2670,7 @@
           <a:p>
             <a:fld id="{E37A5BA7-640B-4993-BC4B-2A86B10B6055}" type="datetimeFigureOut">
               <a:rPr lang="de-DE" smtClean="0"/>
-              <a:t>24.01.2025</a:t>
+              <a:t>05.02.2025</a:t>
             </a:fld>
             <a:endParaRPr lang="de-DE"/>
           </a:p>
@@ -2910,7 +2911,7 @@
           <a:p>
             <a:fld id="{E37A5BA7-640B-4993-BC4B-2A86B10B6055}" type="datetimeFigureOut">
               <a:rPr lang="de-DE" smtClean="0"/>
-              <a:t>24.01.2025</a:t>
+              <a:t>05.02.2025</a:t>
             </a:fld>
             <a:endParaRPr lang="de-DE"/>
           </a:p>
@@ -4546,6 +4547,349 @@
 </p:sld>
 </file>
 
+<file path=ppt/slides/slide3.xml><?xml version="1.0" encoding="utf-8"?>
+<p:sld xmlns:a="http://schemas.openxmlformats.org/drawingml/2006/main" xmlns:r="http://schemas.openxmlformats.org/officeDocument/2006/relationships" xmlns:p="http://schemas.openxmlformats.org/presentationml/2006/main">
+  <p:cSld>
+    <p:spTree>
+      <p:nvGrpSpPr>
+        <p:cNvPr id="1" name="">
+          <a:extLst>
+            <a:ext uri="{FF2B5EF4-FFF2-40B4-BE49-F238E27FC236}">
+              <a16:creationId xmlns:a16="http://schemas.microsoft.com/office/drawing/2014/main" id="{4A2BEAEB-8BD3-A883-7428-D8C94E109E36}"/>
+            </a:ext>
+          </a:extLst>
+        </p:cNvPr>
+        <p:cNvGrpSpPr/>
+        <p:nvPr/>
+      </p:nvGrpSpPr>
+      <p:grpSpPr>
+        <a:xfrm>
+          <a:off x="0" y="0"/>
+          <a:ext cx="0" cy="0"/>
+          <a:chOff x="0" y="0"/>
+          <a:chExt cx="0" cy="0"/>
+        </a:xfrm>
+      </p:grpSpPr>
+      <p:pic>
+        <p:nvPicPr>
+          <p:cNvPr id="4" name="Grafik 3" descr="Ein Bild, das Text, Screenshot, Software, Betriebssystem enthält.&#10;&#10;KI-generierte Inhalte können fehlerhaft sein.">
+            <a:extLst>
+              <a:ext uri="{FF2B5EF4-FFF2-40B4-BE49-F238E27FC236}">
+                <a16:creationId xmlns:a16="http://schemas.microsoft.com/office/drawing/2014/main" id="{ECF919AF-1DE0-FCC9-5BB3-810AD82ED063}"/>
+              </a:ext>
+            </a:extLst>
+          </p:cNvPr>
+          <p:cNvPicPr>
+            <a:picLocks noChangeAspect="1"/>
+          </p:cNvPicPr>
+          <p:nvPr/>
+        </p:nvPicPr>
+        <p:blipFill>
+          <a:blip r:embed="rId2">
+            <a:extLst>
+              <a:ext uri="{28A0092B-C50C-407E-A947-70E740481C1C}">
+                <a14:useLocalDpi xmlns:a14="http://schemas.microsoft.com/office/drawing/2010/main" val="0"/>
+              </a:ext>
+            </a:extLst>
+          </a:blip>
+          <a:stretch>
+            <a:fillRect/>
+          </a:stretch>
+        </p:blipFill>
+        <p:spPr>
+          <a:xfrm>
+            <a:off x="2074367" y="904568"/>
+            <a:ext cx="1904420" cy="4124632"/>
+          </a:xfrm>
+          <a:prstGeom prst="rect">
+            <a:avLst/>
+          </a:prstGeom>
+        </p:spPr>
+      </p:pic>
+      <p:sp>
+        <p:nvSpPr>
+          <p:cNvPr id="5" name="Rechteck: abgerundete Ecken 4">
+            <a:extLst>
+              <a:ext uri="{FF2B5EF4-FFF2-40B4-BE49-F238E27FC236}">
+                <a16:creationId xmlns:a16="http://schemas.microsoft.com/office/drawing/2014/main" id="{9E373728-70BC-2620-3A15-24F7F6F94E6B}"/>
+              </a:ext>
+            </a:extLst>
+          </p:cNvPr>
+          <p:cNvSpPr/>
+          <p:nvPr/>
+        </p:nvSpPr>
+        <p:spPr>
+          <a:xfrm>
+            <a:off x="2163097" y="3637935"/>
+            <a:ext cx="1700980" cy="226142"/>
+          </a:xfrm>
+          <a:prstGeom prst="roundRect">
+            <a:avLst/>
+          </a:prstGeom>
+          <a:noFill/>
+        </p:spPr>
+        <p:style>
+          <a:lnRef idx="2">
+            <a:schemeClr val="accent2"/>
+          </a:lnRef>
+          <a:fillRef idx="1">
+            <a:schemeClr val="lt1"/>
+          </a:fillRef>
+          <a:effectRef idx="0">
+            <a:schemeClr val="accent2"/>
+          </a:effectRef>
+          <a:fontRef idx="minor">
+            <a:schemeClr val="dk1"/>
+          </a:fontRef>
+        </p:style>
+        <p:txBody>
+          <a:bodyPr rtlCol="0" anchor="ctr"/>
+          <a:lstStyle/>
+          <a:p>
+            <a:pPr algn="ctr"/>
+            <a:endParaRPr lang="de-DE"/>
+          </a:p>
+        </p:txBody>
+      </p:sp>
+      <p:pic>
+        <p:nvPicPr>
+          <p:cNvPr id="7" name="Grafik 6" descr="Ein Bild, das Text, Elektronik, Screenshot, Software enthält.&#10;&#10;KI-generierte Inhalte können fehlerhaft sein.">
+            <a:extLst>
+              <a:ext uri="{FF2B5EF4-FFF2-40B4-BE49-F238E27FC236}">
+                <a16:creationId xmlns:a16="http://schemas.microsoft.com/office/drawing/2014/main" id="{CDAC01D8-9797-01B9-35D6-70360ED05343}"/>
+              </a:ext>
+            </a:extLst>
+          </p:cNvPr>
+          <p:cNvPicPr>
+            <a:picLocks noChangeAspect="1"/>
+          </p:cNvPicPr>
+          <p:nvPr/>
+        </p:nvPicPr>
+        <p:blipFill>
+          <a:blip r:embed="rId3">
+            <a:extLst>
+              <a:ext uri="{28A0092B-C50C-407E-A947-70E740481C1C}">
+                <a14:useLocalDpi xmlns:a14="http://schemas.microsoft.com/office/drawing/2010/main" val="0"/>
+              </a:ext>
+            </a:extLst>
+          </a:blip>
+          <a:stretch>
+            <a:fillRect/>
+          </a:stretch>
+        </p:blipFill>
+        <p:spPr>
+          <a:xfrm>
+            <a:off x="4369323" y="904568"/>
+            <a:ext cx="1905932" cy="4124632"/>
+          </a:xfrm>
+          <a:prstGeom prst="rect">
+            <a:avLst/>
+          </a:prstGeom>
+        </p:spPr>
+      </p:pic>
+      <p:sp>
+        <p:nvSpPr>
+          <p:cNvPr id="8" name="Rechteck: abgerundete Ecken 7">
+            <a:extLst>
+              <a:ext uri="{FF2B5EF4-FFF2-40B4-BE49-F238E27FC236}">
+                <a16:creationId xmlns:a16="http://schemas.microsoft.com/office/drawing/2014/main" id="{02D1388C-6A6D-E9A3-E137-755C65F8ACDF}"/>
+              </a:ext>
+            </a:extLst>
+          </p:cNvPr>
+          <p:cNvSpPr/>
+          <p:nvPr/>
+        </p:nvSpPr>
+        <p:spPr>
+          <a:xfrm>
+            <a:off x="5697794" y="1224115"/>
+            <a:ext cx="577461" cy="211395"/>
+          </a:xfrm>
+          <a:prstGeom prst="roundRect">
+            <a:avLst/>
+          </a:prstGeom>
+          <a:noFill/>
+        </p:spPr>
+        <p:style>
+          <a:lnRef idx="2">
+            <a:schemeClr val="accent2"/>
+          </a:lnRef>
+          <a:fillRef idx="1">
+            <a:schemeClr val="lt1"/>
+          </a:fillRef>
+          <a:effectRef idx="0">
+            <a:schemeClr val="accent2"/>
+          </a:effectRef>
+          <a:fontRef idx="minor">
+            <a:schemeClr val="dk1"/>
+          </a:fontRef>
+        </p:style>
+        <p:txBody>
+          <a:bodyPr rtlCol="0" anchor="ctr"/>
+          <a:lstStyle/>
+          <a:p>
+            <a:pPr algn="ctr"/>
+            <a:endParaRPr lang="de-DE"/>
+          </a:p>
+        </p:txBody>
+      </p:sp>
+      <p:pic>
+        <p:nvPicPr>
+          <p:cNvPr id="12" name="Grafik 11">
+            <a:extLst>
+              <a:ext uri="{FF2B5EF4-FFF2-40B4-BE49-F238E27FC236}">
+                <a16:creationId xmlns:a16="http://schemas.microsoft.com/office/drawing/2014/main" id="{7264C391-8940-C88A-E9C9-A54D411F051E}"/>
+              </a:ext>
+            </a:extLst>
+          </p:cNvPr>
+          <p:cNvPicPr>
+            <a:picLocks noChangeAspect="1"/>
+          </p:cNvPicPr>
+          <p:nvPr/>
+        </p:nvPicPr>
+        <p:blipFill>
+          <a:blip r:embed="rId4"/>
+          <a:stretch>
+            <a:fillRect/>
+          </a:stretch>
+        </p:blipFill>
+        <p:spPr>
+          <a:xfrm>
+            <a:off x="6665791" y="935231"/>
+            <a:ext cx="1510128" cy="4093970"/>
+          </a:xfrm>
+          <a:prstGeom prst="rect">
+            <a:avLst/>
+          </a:prstGeom>
+        </p:spPr>
+      </p:pic>
+      <p:sp>
+        <p:nvSpPr>
+          <p:cNvPr id="14" name="Rechteck: abgerundete Ecken 13">
+            <a:extLst>
+              <a:ext uri="{FF2B5EF4-FFF2-40B4-BE49-F238E27FC236}">
+                <a16:creationId xmlns:a16="http://schemas.microsoft.com/office/drawing/2014/main" id="{9F232217-EF24-A31E-7E29-050F26BF9A41}"/>
+              </a:ext>
+            </a:extLst>
+          </p:cNvPr>
+          <p:cNvSpPr/>
+          <p:nvPr/>
+        </p:nvSpPr>
+        <p:spPr>
+          <a:xfrm>
+            <a:off x="6695287" y="3898489"/>
+            <a:ext cx="1480632" cy="221227"/>
+          </a:xfrm>
+          <a:prstGeom prst="roundRect">
+            <a:avLst/>
+          </a:prstGeom>
+          <a:noFill/>
+        </p:spPr>
+        <p:style>
+          <a:lnRef idx="2">
+            <a:schemeClr val="accent2"/>
+          </a:lnRef>
+          <a:fillRef idx="1">
+            <a:schemeClr val="lt1"/>
+          </a:fillRef>
+          <a:effectRef idx="0">
+            <a:schemeClr val="accent2"/>
+          </a:effectRef>
+          <a:fontRef idx="minor">
+            <a:schemeClr val="dk1"/>
+          </a:fontRef>
+        </p:style>
+        <p:txBody>
+          <a:bodyPr rtlCol="0" anchor="ctr"/>
+          <a:lstStyle/>
+          <a:p>
+            <a:pPr algn="ctr"/>
+            <a:endParaRPr lang="de-DE"/>
+          </a:p>
+        </p:txBody>
+      </p:sp>
+      <p:sp>
+        <p:nvSpPr>
+          <p:cNvPr id="18" name="Textfeld 17">
+            <a:extLst>
+              <a:ext uri="{FF2B5EF4-FFF2-40B4-BE49-F238E27FC236}">
+                <a16:creationId xmlns:a16="http://schemas.microsoft.com/office/drawing/2014/main" id="{9C63D386-CA8C-2878-17D8-59DD5D9181AE}"/>
+              </a:ext>
+            </a:extLst>
+          </p:cNvPr>
+          <p:cNvSpPr txBox="1"/>
+          <p:nvPr/>
+        </p:nvSpPr>
+        <p:spPr>
+          <a:xfrm>
+            <a:off x="3726427" y="429414"/>
+            <a:ext cx="873957" cy="369332"/>
+          </a:xfrm>
+          <a:prstGeom prst="rect">
+            <a:avLst/>
+          </a:prstGeom>
+          <a:noFill/>
+        </p:spPr>
+        <p:txBody>
+          <a:bodyPr wrap="none" rtlCol="0">
+            <a:spAutoFit/>
+          </a:bodyPr>
+          <a:lstStyle/>
+          <a:p>
+            <a:r>
+              <a:rPr lang="de-DE" dirty="0"/>
+              <a:t>iPhone</a:t>
+            </a:r>
+          </a:p>
+        </p:txBody>
+      </p:sp>
+      <p:sp>
+        <p:nvSpPr>
+          <p:cNvPr id="19" name="Textfeld 18">
+            <a:extLst>
+              <a:ext uri="{FF2B5EF4-FFF2-40B4-BE49-F238E27FC236}">
+                <a16:creationId xmlns:a16="http://schemas.microsoft.com/office/drawing/2014/main" id="{E469E4A2-B8DF-7F8E-72FF-141A74CA8DA6}"/>
+              </a:ext>
+            </a:extLst>
+          </p:cNvPr>
+          <p:cNvSpPr txBox="1"/>
+          <p:nvPr/>
+        </p:nvSpPr>
+        <p:spPr>
+          <a:xfrm>
+            <a:off x="6983876" y="429414"/>
+            <a:ext cx="962186" cy="369332"/>
+          </a:xfrm>
+          <a:prstGeom prst="rect">
+            <a:avLst/>
+          </a:prstGeom>
+          <a:noFill/>
+        </p:spPr>
+        <p:txBody>
+          <a:bodyPr wrap="none" rtlCol="0">
+            <a:spAutoFit/>
+          </a:bodyPr>
+          <a:lstStyle/>
+          <a:p>
+            <a:r>
+              <a:rPr lang="de-DE" dirty="0"/>
+              <a:t>Android</a:t>
+            </a:r>
+          </a:p>
+        </p:txBody>
+      </p:sp>
+    </p:spTree>
+    <p:extLst>
+      <p:ext uri="{BB962C8B-B14F-4D97-AF65-F5344CB8AC3E}">
+        <p14:creationId xmlns:p14="http://schemas.microsoft.com/office/powerpoint/2010/main" val="2519258468"/>
+      </p:ext>
+    </p:extLst>
+  </p:cSld>
+  <p:clrMapOvr>
+    <a:masterClrMapping/>
+  </p:clrMapOvr>
+</p:sld>
+</file>
+
 <file path=ppt/theme/theme1.xml><?xml version="1.0" encoding="utf-8"?>
 <a:theme xmlns:a="http://schemas.openxmlformats.org/drawingml/2006/main" name="Office">
   <a:themeElements>

</xml_diff>